<commit_message>
3-Se actualizan binarios para Trabajar con amazon
</commit_message>
<xml_diff>
--- a/Presentación1.pptx
+++ b/Presentación1.pptx
@@ -1,20 +1,117 @@
 
 <file path=ppt/presentation.xml><?xml version="1.0" encoding="utf-8"?>
-<p:presentation xmlns:a="http://schemas.openxmlformats.org/drawingml/2006/main" xmlns:p="http://schemas.openxmlformats.org/presentationml/2006/main" xmlns:r="http://schemas.openxmlformats.org/officeDocument/2006/relationships" xmlns:p14="http://schemas.microsoft.com/office/powerpoint/2010/main" xmlns:p15="http://schemas.microsoft.com/office/powerpoint/2012/main" xmlns:mc="http://schemas.openxmlformats.org/markup-compatibility/2006">
+<p:presentation xmlns:a="http://schemas.openxmlformats.org/drawingml/2006/main" xmlns:r="http://schemas.openxmlformats.org/officeDocument/2006/relationships" xmlns:p="http://schemas.openxmlformats.org/presentationml/2006/main">
   <p:sldMasterIdLst>
-    <p:sldMasterId id="2147483648" r:id="rId2"/>
+    <p:sldMasterId id="2147483648" r:id="rId1"/>
   </p:sldMasterIdLst>
   <p:sldIdLst>
-    <p:sldId id="256" r:id="rId3"/>
-    <p:sldId id="257" r:id="rId4"/>
+    <p:sldId id="256" r:id="rId2"/>
+    <p:sldId id="257" r:id="rId3"/>
+    <p:sldId id="258" r:id="rId4"/>
+    <p:sldId id="259" r:id="rId5"/>
   </p:sldIdLst>
-  <p:sldSz cx="9144000" cy="6858000"/>
-  <p:notesSz cx="7559675" cy="10691812"/>
+  <p:sldSz cx="9144000" cy="6858000" type="screen4x3"/>
+  <p:notesSz cx="7559675" cy="10691813"/>
+  <p:defaultTextStyle>
+    <a:defPPr>
+      <a:defRPr lang="es-MX"/>
+    </a:defPPr>
+    <a:lvl1pPr marL="0" algn="l" defTabSz="914400" rtl="0" eaLnBrk="1" latinLnBrk="0" hangingPunct="1">
+      <a:defRPr sz="1800" kern="1200">
+        <a:solidFill>
+          <a:schemeClr val="tx1"/>
+        </a:solidFill>
+        <a:latin typeface="+mn-lt"/>
+        <a:ea typeface="+mn-ea"/>
+        <a:cs typeface="+mn-cs"/>
+      </a:defRPr>
+    </a:lvl1pPr>
+    <a:lvl2pPr marL="457200" algn="l" defTabSz="914400" rtl="0" eaLnBrk="1" latinLnBrk="0" hangingPunct="1">
+      <a:defRPr sz="1800" kern="1200">
+        <a:solidFill>
+          <a:schemeClr val="tx1"/>
+        </a:solidFill>
+        <a:latin typeface="+mn-lt"/>
+        <a:ea typeface="+mn-ea"/>
+        <a:cs typeface="+mn-cs"/>
+      </a:defRPr>
+    </a:lvl2pPr>
+    <a:lvl3pPr marL="914400" algn="l" defTabSz="914400" rtl="0" eaLnBrk="1" latinLnBrk="0" hangingPunct="1">
+      <a:defRPr sz="1800" kern="1200">
+        <a:solidFill>
+          <a:schemeClr val="tx1"/>
+        </a:solidFill>
+        <a:latin typeface="+mn-lt"/>
+        <a:ea typeface="+mn-ea"/>
+        <a:cs typeface="+mn-cs"/>
+      </a:defRPr>
+    </a:lvl3pPr>
+    <a:lvl4pPr marL="1371600" algn="l" defTabSz="914400" rtl="0" eaLnBrk="1" latinLnBrk="0" hangingPunct="1">
+      <a:defRPr sz="1800" kern="1200">
+        <a:solidFill>
+          <a:schemeClr val="tx1"/>
+        </a:solidFill>
+        <a:latin typeface="+mn-lt"/>
+        <a:ea typeface="+mn-ea"/>
+        <a:cs typeface="+mn-cs"/>
+      </a:defRPr>
+    </a:lvl4pPr>
+    <a:lvl5pPr marL="1828800" algn="l" defTabSz="914400" rtl="0" eaLnBrk="1" latinLnBrk="0" hangingPunct="1">
+      <a:defRPr sz="1800" kern="1200">
+        <a:solidFill>
+          <a:schemeClr val="tx1"/>
+        </a:solidFill>
+        <a:latin typeface="+mn-lt"/>
+        <a:ea typeface="+mn-ea"/>
+        <a:cs typeface="+mn-cs"/>
+      </a:defRPr>
+    </a:lvl5pPr>
+    <a:lvl6pPr marL="2286000" algn="l" defTabSz="914400" rtl="0" eaLnBrk="1" latinLnBrk="0" hangingPunct="1">
+      <a:defRPr sz="1800" kern="1200">
+        <a:solidFill>
+          <a:schemeClr val="tx1"/>
+        </a:solidFill>
+        <a:latin typeface="+mn-lt"/>
+        <a:ea typeface="+mn-ea"/>
+        <a:cs typeface="+mn-cs"/>
+      </a:defRPr>
+    </a:lvl6pPr>
+    <a:lvl7pPr marL="2743200" algn="l" defTabSz="914400" rtl="0" eaLnBrk="1" latinLnBrk="0" hangingPunct="1">
+      <a:defRPr sz="1800" kern="1200">
+        <a:solidFill>
+          <a:schemeClr val="tx1"/>
+        </a:solidFill>
+        <a:latin typeface="+mn-lt"/>
+        <a:ea typeface="+mn-ea"/>
+        <a:cs typeface="+mn-cs"/>
+      </a:defRPr>
+    </a:lvl7pPr>
+    <a:lvl8pPr marL="3200400" algn="l" defTabSz="914400" rtl="0" eaLnBrk="1" latinLnBrk="0" hangingPunct="1">
+      <a:defRPr sz="1800" kern="1200">
+        <a:solidFill>
+          <a:schemeClr val="tx1"/>
+        </a:solidFill>
+        <a:latin typeface="+mn-lt"/>
+        <a:ea typeface="+mn-ea"/>
+        <a:cs typeface="+mn-cs"/>
+      </a:defRPr>
+    </a:lvl8pPr>
+    <a:lvl9pPr marL="3657600" algn="l" defTabSz="914400" rtl="0" eaLnBrk="1" latinLnBrk="0" hangingPunct="1">
+      <a:defRPr sz="1800" kern="1200">
+        <a:solidFill>
+          <a:schemeClr val="tx1"/>
+        </a:solidFill>
+        <a:latin typeface="+mn-lt"/>
+        <a:ea typeface="+mn-ea"/>
+        <a:cs typeface="+mn-cs"/>
+      </a:defRPr>
+    </a:lvl9pPr>
+  </p:defaultTextStyle>
 </p:presentation>
 </file>
 
 <file path=ppt/slideLayouts/slideLayout1.xml><?xml version="1.0" encoding="utf-8"?>
-<p:sldLayout xmlns:a="http://schemas.openxmlformats.org/drawingml/2006/main" xmlns:p="http://schemas.openxmlformats.org/presentationml/2006/main" xmlns:r="http://schemas.openxmlformats.org/officeDocument/2006/relationships" xmlns:p14="http://schemas.microsoft.com/office/powerpoint/2010/main" xmlns:p15="http://schemas.microsoft.com/office/powerpoint/2012/main" xmlns:mc="http://schemas.openxmlformats.org/markup-compatibility/2006" type="blank" preserve="1">
+<p:sldLayout xmlns:a="http://schemas.openxmlformats.org/drawingml/2006/main" xmlns:r="http://schemas.openxmlformats.org/officeDocument/2006/relationships" xmlns:p="http://schemas.openxmlformats.org/presentationml/2006/main" type="blank" preserve="1">
   <p:cSld name="Blank Slide">
     <p:spTree>
       <p:nvGrpSpPr>
@@ -32,11 +129,14 @@
       </p:grpSpPr>
     </p:spTree>
   </p:cSld>
+  <p:clrMapOvr>
+    <a:masterClrMapping/>
+  </p:clrMapOvr>
 </p:sldLayout>
 </file>
 
 <file path=ppt/slideLayouts/slideLayout10.xml><?xml version="1.0" encoding="utf-8"?>
-<p:sldLayout xmlns:a="http://schemas.openxmlformats.org/drawingml/2006/main" xmlns:p="http://schemas.openxmlformats.org/presentationml/2006/main" xmlns:r="http://schemas.openxmlformats.org/officeDocument/2006/relationships" xmlns:p14="http://schemas.microsoft.com/office/powerpoint/2010/main" xmlns:p15="http://schemas.microsoft.com/office/powerpoint/2012/main" xmlns:mc="http://schemas.openxmlformats.org/markup-compatibility/2006" type="objOverTx" preserve="1">
+<p:sldLayout xmlns:a="http://schemas.openxmlformats.org/drawingml/2006/main" xmlns:r="http://schemas.openxmlformats.org/officeDocument/2006/relationships" xmlns:p="http://schemas.openxmlformats.org/presentationml/2006/main" type="objOverTx" preserve="1">
   <p:cSld name="Title, Content over Content">
     <p:spTree>
       <p:nvGrpSpPr>
@@ -72,15 +172,16 @@
           </a:prstGeom>
         </p:spPr>
         <p:txBody>
-          <a:bodyPr lIns="0" rIns="0" tIns="0" bIns="0" anchor="ctr"/>
-          <a:p>
-            <a:endParaRPr b="0" lang="es-MX" sz="1800" spc="-1" strike="noStrike">
-              <a:solidFill>
-                <a:srgbClr val="000000"/>
-              </a:solidFill>
-              <a:uFill>
-                <a:solidFill>
-                  <a:srgbClr val="ffffff"/>
+          <a:bodyPr lIns="0" tIns="0" rIns="0" bIns="0" anchor="ctr"/>
+          <a:lstStyle/>
+          <a:p>
+            <a:endParaRPr lang="es-MX" sz="1800" b="0" strike="noStrike" spc="-1">
+              <a:solidFill>
+                <a:srgbClr val="000000"/>
+              </a:solidFill>
+              <a:uFill>
+                <a:solidFill>
+                  <a:srgbClr val="FFFFFF"/>
                 </a:solidFill>
               </a:uFill>
               <a:latin typeface="Calibri"/>
@@ -108,15 +209,16 @@
           </a:prstGeom>
         </p:spPr>
         <p:txBody>
-          <a:bodyPr lIns="0" rIns="0" tIns="0" bIns="0"/>
-          <a:p>
-            <a:endParaRPr b="0" lang="es-MX" sz="3200" spc="-1" strike="noStrike">
-              <a:solidFill>
-                <a:srgbClr val="000000"/>
-              </a:solidFill>
-              <a:uFill>
-                <a:solidFill>
-                  <a:srgbClr val="ffffff"/>
+          <a:bodyPr lIns="0" tIns="0" rIns="0" bIns="0"/>
+          <a:lstStyle/>
+          <a:p>
+            <a:endParaRPr lang="es-MX" sz="3200" b="0" strike="noStrike" spc="-1">
+              <a:solidFill>
+                <a:srgbClr val="000000"/>
+              </a:solidFill>
+              <a:uFill>
+                <a:solidFill>
+                  <a:srgbClr val="FFFFFF"/>
                 </a:solidFill>
               </a:uFill>
               <a:latin typeface="Calibri"/>
@@ -144,15 +246,16 @@
           </a:prstGeom>
         </p:spPr>
         <p:txBody>
-          <a:bodyPr lIns="0" rIns="0" tIns="0" bIns="0"/>
-          <a:p>
-            <a:endParaRPr b="0" lang="es-MX" sz="3200" spc="-1" strike="noStrike">
-              <a:solidFill>
-                <a:srgbClr val="000000"/>
-              </a:solidFill>
-              <a:uFill>
-                <a:solidFill>
-                  <a:srgbClr val="ffffff"/>
+          <a:bodyPr lIns="0" tIns="0" rIns="0" bIns="0"/>
+          <a:lstStyle/>
+          <a:p>
+            <a:endParaRPr lang="es-MX" sz="3200" b="0" strike="noStrike" spc="-1">
+              <a:solidFill>
+                <a:srgbClr val="000000"/>
+              </a:solidFill>
+              <a:uFill>
+                <a:solidFill>
+                  <a:srgbClr val="FFFFFF"/>
                 </a:solidFill>
               </a:uFill>
               <a:latin typeface="Calibri"/>
@@ -162,11 +265,14 @@
       </p:sp>
     </p:spTree>
   </p:cSld>
+  <p:clrMapOvr>
+    <a:masterClrMapping/>
+  </p:clrMapOvr>
 </p:sldLayout>
 </file>
 
 <file path=ppt/slideLayouts/slideLayout11.xml><?xml version="1.0" encoding="utf-8"?>
-<p:sldLayout xmlns:a="http://schemas.openxmlformats.org/drawingml/2006/main" xmlns:p="http://schemas.openxmlformats.org/presentationml/2006/main" xmlns:r="http://schemas.openxmlformats.org/officeDocument/2006/relationships" xmlns:p14="http://schemas.microsoft.com/office/powerpoint/2010/main" xmlns:p15="http://schemas.microsoft.com/office/powerpoint/2012/main" xmlns:mc="http://schemas.openxmlformats.org/markup-compatibility/2006" type="fourObj" preserve="1">
+<p:sldLayout xmlns:a="http://schemas.openxmlformats.org/drawingml/2006/main" xmlns:r="http://schemas.openxmlformats.org/officeDocument/2006/relationships" xmlns:p="http://schemas.openxmlformats.org/presentationml/2006/main" type="fourObj" preserve="1">
   <p:cSld name="Title, 4 Content">
     <p:spTree>
       <p:nvGrpSpPr>
@@ -202,15 +308,16 @@
           </a:prstGeom>
         </p:spPr>
         <p:txBody>
-          <a:bodyPr lIns="0" rIns="0" tIns="0" bIns="0" anchor="ctr"/>
-          <a:p>
-            <a:endParaRPr b="0" lang="es-MX" sz="1800" spc="-1" strike="noStrike">
-              <a:solidFill>
-                <a:srgbClr val="000000"/>
-              </a:solidFill>
-              <a:uFill>
-                <a:solidFill>
-                  <a:srgbClr val="ffffff"/>
+          <a:bodyPr lIns="0" tIns="0" rIns="0" bIns="0" anchor="ctr"/>
+          <a:lstStyle/>
+          <a:p>
+            <a:endParaRPr lang="es-MX" sz="1800" b="0" strike="noStrike" spc="-1">
+              <a:solidFill>
+                <a:srgbClr val="000000"/>
+              </a:solidFill>
+              <a:uFill>
+                <a:solidFill>
+                  <a:srgbClr val="FFFFFF"/>
                 </a:solidFill>
               </a:uFill>
               <a:latin typeface="Calibri"/>
@@ -238,15 +345,16 @@
           </a:prstGeom>
         </p:spPr>
         <p:txBody>
-          <a:bodyPr lIns="0" rIns="0" tIns="0" bIns="0"/>
-          <a:p>
-            <a:endParaRPr b="0" lang="es-MX" sz="3200" spc="-1" strike="noStrike">
-              <a:solidFill>
-                <a:srgbClr val="000000"/>
-              </a:solidFill>
-              <a:uFill>
-                <a:solidFill>
-                  <a:srgbClr val="ffffff"/>
+          <a:bodyPr lIns="0" tIns="0" rIns="0" bIns="0"/>
+          <a:lstStyle/>
+          <a:p>
+            <a:endParaRPr lang="es-MX" sz="3200" b="0" strike="noStrike" spc="-1">
+              <a:solidFill>
+                <a:srgbClr val="000000"/>
+              </a:solidFill>
+              <a:uFill>
+                <a:solidFill>
+                  <a:srgbClr val="FFFFFF"/>
                 </a:solidFill>
               </a:uFill>
               <a:latin typeface="Calibri"/>
@@ -274,15 +382,16 @@
           </a:prstGeom>
         </p:spPr>
         <p:txBody>
-          <a:bodyPr lIns="0" rIns="0" tIns="0" bIns="0"/>
-          <a:p>
-            <a:endParaRPr b="0" lang="es-MX" sz="3200" spc="-1" strike="noStrike">
-              <a:solidFill>
-                <a:srgbClr val="000000"/>
-              </a:solidFill>
-              <a:uFill>
-                <a:solidFill>
-                  <a:srgbClr val="ffffff"/>
+          <a:bodyPr lIns="0" tIns="0" rIns="0" bIns="0"/>
+          <a:lstStyle/>
+          <a:p>
+            <a:endParaRPr lang="es-MX" sz="3200" b="0" strike="noStrike" spc="-1">
+              <a:solidFill>
+                <a:srgbClr val="000000"/>
+              </a:solidFill>
+              <a:uFill>
+                <a:solidFill>
+                  <a:srgbClr val="FFFFFF"/>
                 </a:solidFill>
               </a:uFill>
               <a:latin typeface="Calibri"/>
@@ -310,15 +419,16 @@
           </a:prstGeom>
         </p:spPr>
         <p:txBody>
-          <a:bodyPr lIns="0" rIns="0" tIns="0" bIns="0"/>
-          <a:p>
-            <a:endParaRPr b="0" lang="es-MX" sz="3200" spc="-1" strike="noStrike">
-              <a:solidFill>
-                <a:srgbClr val="000000"/>
-              </a:solidFill>
-              <a:uFill>
-                <a:solidFill>
-                  <a:srgbClr val="ffffff"/>
+          <a:bodyPr lIns="0" tIns="0" rIns="0" bIns="0"/>
+          <a:lstStyle/>
+          <a:p>
+            <a:endParaRPr lang="es-MX" sz="3200" b="0" strike="noStrike" spc="-1">
+              <a:solidFill>
+                <a:srgbClr val="000000"/>
+              </a:solidFill>
+              <a:uFill>
+                <a:solidFill>
+                  <a:srgbClr val="FFFFFF"/>
                 </a:solidFill>
               </a:uFill>
               <a:latin typeface="Calibri"/>
@@ -346,15 +456,16 @@
           </a:prstGeom>
         </p:spPr>
         <p:txBody>
-          <a:bodyPr lIns="0" rIns="0" tIns="0" bIns="0"/>
-          <a:p>
-            <a:endParaRPr b="0" lang="es-MX" sz="3200" spc="-1" strike="noStrike">
-              <a:solidFill>
-                <a:srgbClr val="000000"/>
-              </a:solidFill>
-              <a:uFill>
-                <a:solidFill>
-                  <a:srgbClr val="ffffff"/>
+          <a:bodyPr lIns="0" tIns="0" rIns="0" bIns="0"/>
+          <a:lstStyle/>
+          <a:p>
+            <a:endParaRPr lang="es-MX" sz="3200" b="0" strike="noStrike" spc="-1">
+              <a:solidFill>
+                <a:srgbClr val="000000"/>
+              </a:solidFill>
+              <a:uFill>
+                <a:solidFill>
+                  <a:srgbClr val="FFFFFF"/>
                 </a:solidFill>
               </a:uFill>
               <a:latin typeface="Calibri"/>
@@ -364,11 +475,14 @@
       </p:sp>
     </p:spTree>
   </p:cSld>
+  <p:clrMapOvr>
+    <a:masterClrMapping/>
+  </p:clrMapOvr>
 </p:sldLayout>
 </file>
 
 <file path=ppt/slideLayouts/slideLayout12.xml><?xml version="1.0" encoding="utf-8"?>
-<p:sldLayout xmlns:a="http://schemas.openxmlformats.org/drawingml/2006/main" xmlns:p="http://schemas.openxmlformats.org/presentationml/2006/main" xmlns:r="http://schemas.openxmlformats.org/officeDocument/2006/relationships" xmlns:p14="http://schemas.microsoft.com/office/powerpoint/2010/main" xmlns:p15="http://schemas.microsoft.com/office/powerpoint/2012/main" xmlns:mc="http://schemas.openxmlformats.org/markup-compatibility/2006" type="blank" preserve="1">
+<p:sldLayout xmlns:a="http://schemas.openxmlformats.org/drawingml/2006/main" xmlns:r="http://schemas.openxmlformats.org/officeDocument/2006/relationships" xmlns:p="http://schemas.openxmlformats.org/presentationml/2006/main" type="blank" preserve="1">
   <p:cSld name="Title, 6 Content">
     <p:spTree>
       <p:nvGrpSpPr>
@@ -404,15 +518,16 @@
           </a:prstGeom>
         </p:spPr>
         <p:txBody>
-          <a:bodyPr lIns="0" rIns="0" tIns="0" bIns="0" anchor="ctr"/>
-          <a:p>
-            <a:endParaRPr b="0" lang="es-MX" sz="1800" spc="-1" strike="noStrike">
-              <a:solidFill>
-                <a:srgbClr val="000000"/>
-              </a:solidFill>
-              <a:uFill>
-                <a:solidFill>
-                  <a:srgbClr val="ffffff"/>
+          <a:bodyPr lIns="0" tIns="0" rIns="0" bIns="0" anchor="ctr"/>
+          <a:lstStyle/>
+          <a:p>
+            <a:endParaRPr lang="es-MX" sz="1800" b="0" strike="noStrike" spc="-1">
+              <a:solidFill>
+                <a:srgbClr val="000000"/>
+              </a:solidFill>
+              <a:uFill>
+                <a:solidFill>
+                  <a:srgbClr val="FFFFFF"/>
                 </a:solidFill>
               </a:uFill>
               <a:latin typeface="Calibri"/>
@@ -440,15 +555,16 @@
           </a:prstGeom>
         </p:spPr>
         <p:txBody>
-          <a:bodyPr lIns="0" rIns="0" tIns="0" bIns="0"/>
-          <a:p>
-            <a:endParaRPr b="0" lang="es-MX" sz="3200" spc="-1" strike="noStrike">
-              <a:solidFill>
-                <a:srgbClr val="000000"/>
-              </a:solidFill>
-              <a:uFill>
-                <a:solidFill>
-                  <a:srgbClr val="ffffff"/>
+          <a:bodyPr lIns="0" tIns="0" rIns="0" bIns="0"/>
+          <a:lstStyle/>
+          <a:p>
+            <a:endParaRPr lang="es-MX" sz="3200" b="0" strike="noStrike" spc="-1">
+              <a:solidFill>
+                <a:srgbClr val="000000"/>
+              </a:solidFill>
+              <a:uFill>
+                <a:solidFill>
+                  <a:srgbClr val="FFFFFF"/>
                 </a:solidFill>
               </a:uFill>
               <a:latin typeface="Calibri"/>
@@ -476,15 +592,16 @@
           </a:prstGeom>
         </p:spPr>
         <p:txBody>
-          <a:bodyPr lIns="0" rIns="0" tIns="0" bIns="0"/>
-          <a:p>
-            <a:endParaRPr b="0" lang="es-MX" sz="3200" spc="-1" strike="noStrike">
-              <a:solidFill>
-                <a:srgbClr val="000000"/>
-              </a:solidFill>
-              <a:uFill>
-                <a:solidFill>
-                  <a:srgbClr val="ffffff"/>
+          <a:bodyPr lIns="0" tIns="0" rIns="0" bIns="0"/>
+          <a:lstStyle/>
+          <a:p>
+            <a:endParaRPr lang="es-MX" sz="3200" b="0" strike="noStrike" spc="-1">
+              <a:solidFill>
+                <a:srgbClr val="000000"/>
+              </a:solidFill>
+              <a:uFill>
+                <a:solidFill>
+                  <a:srgbClr val="FFFFFF"/>
                 </a:solidFill>
               </a:uFill>
               <a:latin typeface="Calibri"/>
@@ -494,7 +611,7 @@
       </p:sp>
       <p:pic>
         <p:nvPicPr>
-          <p:cNvPr id="37" name="" descr=""/>
+          <p:cNvPr id="37" name="36 Imagen"/>
           <p:cNvPicPr/>
           <p:nvPr/>
         </p:nvPicPr>
@@ -517,12 +634,12 @@
       </p:pic>
       <p:pic>
         <p:nvPicPr>
-          <p:cNvPr id="38" name="" descr=""/>
+          <p:cNvPr id="38" name="37 Imagen"/>
           <p:cNvPicPr/>
           <p:nvPr/>
         </p:nvPicPr>
         <p:blipFill>
-          <a:blip r:embed="rId3"/>
+          <a:blip r:embed="rId2"/>
           <a:stretch/>
         </p:blipFill>
         <p:spPr>
@@ -540,11 +657,14 @@
       </p:pic>
     </p:spTree>
   </p:cSld>
+  <p:clrMapOvr>
+    <a:masterClrMapping/>
+  </p:clrMapOvr>
 </p:sldLayout>
 </file>
 
 <file path=ppt/slideLayouts/slideLayout2.xml><?xml version="1.0" encoding="utf-8"?>
-<p:sldLayout xmlns:a="http://schemas.openxmlformats.org/drawingml/2006/main" xmlns:p="http://schemas.openxmlformats.org/presentationml/2006/main" xmlns:r="http://schemas.openxmlformats.org/officeDocument/2006/relationships" xmlns:p14="http://schemas.microsoft.com/office/powerpoint/2010/main" xmlns:p15="http://schemas.microsoft.com/office/powerpoint/2012/main" xmlns:mc="http://schemas.openxmlformats.org/markup-compatibility/2006" type="tx" preserve="1">
+<p:sldLayout xmlns:a="http://schemas.openxmlformats.org/drawingml/2006/main" xmlns:r="http://schemas.openxmlformats.org/officeDocument/2006/relationships" xmlns:p="http://schemas.openxmlformats.org/presentationml/2006/main" type="tx" preserve="1">
   <p:cSld name="Title Slide">
     <p:spTree>
       <p:nvGrpSpPr>
@@ -580,15 +700,16 @@
           </a:prstGeom>
         </p:spPr>
         <p:txBody>
-          <a:bodyPr lIns="0" rIns="0" tIns="0" bIns="0" anchor="ctr"/>
-          <a:p>
-            <a:endParaRPr b="0" lang="es-MX" sz="1800" spc="-1" strike="noStrike">
-              <a:solidFill>
-                <a:srgbClr val="000000"/>
-              </a:solidFill>
-              <a:uFill>
-                <a:solidFill>
-                  <a:srgbClr val="ffffff"/>
+          <a:bodyPr lIns="0" tIns="0" rIns="0" bIns="0" anchor="ctr"/>
+          <a:lstStyle/>
+          <a:p>
+            <a:endParaRPr lang="es-MX" sz="1800" b="0" strike="noStrike" spc="-1">
+              <a:solidFill>
+                <a:srgbClr val="000000"/>
+              </a:solidFill>
+              <a:uFill>
+                <a:solidFill>
+                  <a:srgbClr val="FFFFFF"/>
                 </a:solidFill>
               </a:uFill>
               <a:latin typeface="Calibri"/>
@@ -616,16 +737,17 @@
           </a:prstGeom>
         </p:spPr>
         <p:txBody>
-          <a:bodyPr lIns="0" rIns="0" tIns="0" bIns="0" anchor="ctr"/>
+          <a:bodyPr lIns="0" tIns="0" rIns="0" bIns="0" anchor="ctr"/>
+          <a:lstStyle/>
           <a:p>
             <a:pPr algn="ctr"/>
-            <a:endParaRPr b="0" lang="es-MX" sz="3200" spc="-1" strike="noStrike">
-              <a:solidFill>
-                <a:srgbClr val="000000"/>
-              </a:solidFill>
-              <a:uFill>
-                <a:solidFill>
-                  <a:srgbClr val="ffffff"/>
+            <a:endParaRPr lang="es-MX" sz="3200" b="0" strike="noStrike" spc="-1">
+              <a:solidFill>
+                <a:srgbClr val="000000"/>
+              </a:solidFill>
+              <a:uFill>
+                <a:solidFill>
+                  <a:srgbClr val="FFFFFF"/>
                 </a:solidFill>
               </a:uFill>
               <a:latin typeface="Arial"/>
@@ -635,11 +757,14 @@
       </p:sp>
     </p:spTree>
   </p:cSld>
+  <p:clrMapOvr>
+    <a:masterClrMapping/>
+  </p:clrMapOvr>
 </p:sldLayout>
 </file>
 
 <file path=ppt/slideLayouts/slideLayout3.xml><?xml version="1.0" encoding="utf-8"?>
-<p:sldLayout xmlns:a="http://schemas.openxmlformats.org/drawingml/2006/main" xmlns:p="http://schemas.openxmlformats.org/presentationml/2006/main" xmlns:r="http://schemas.openxmlformats.org/officeDocument/2006/relationships" xmlns:p14="http://schemas.microsoft.com/office/powerpoint/2010/main" xmlns:p15="http://schemas.microsoft.com/office/powerpoint/2012/main" xmlns:mc="http://schemas.openxmlformats.org/markup-compatibility/2006" type="obj" preserve="1">
+<p:sldLayout xmlns:a="http://schemas.openxmlformats.org/drawingml/2006/main" xmlns:r="http://schemas.openxmlformats.org/officeDocument/2006/relationships" xmlns:p="http://schemas.openxmlformats.org/presentationml/2006/main" type="obj" preserve="1">
   <p:cSld name="Title, Content">
     <p:spTree>
       <p:nvGrpSpPr>
@@ -675,15 +800,16 @@
           </a:prstGeom>
         </p:spPr>
         <p:txBody>
-          <a:bodyPr lIns="0" rIns="0" tIns="0" bIns="0" anchor="ctr"/>
-          <a:p>
-            <a:endParaRPr b="0" lang="es-MX" sz="1800" spc="-1" strike="noStrike">
-              <a:solidFill>
-                <a:srgbClr val="000000"/>
-              </a:solidFill>
-              <a:uFill>
-                <a:solidFill>
-                  <a:srgbClr val="ffffff"/>
+          <a:bodyPr lIns="0" tIns="0" rIns="0" bIns="0" anchor="ctr"/>
+          <a:lstStyle/>
+          <a:p>
+            <a:endParaRPr lang="es-MX" sz="1800" b="0" strike="noStrike" spc="-1">
+              <a:solidFill>
+                <a:srgbClr val="000000"/>
+              </a:solidFill>
+              <a:uFill>
+                <a:solidFill>
+                  <a:srgbClr val="FFFFFF"/>
                 </a:solidFill>
               </a:uFill>
               <a:latin typeface="Calibri"/>
@@ -711,15 +837,16 @@
           </a:prstGeom>
         </p:spPr>
         <p:txBody>
-          <a:bodyPr lIns="0" rIns="0" tIns="0" bIns="0"/>
-          <a:p>
-            <a:endParaRPr b="0" lang="es-MX" sz="3200" spc="-1" strike="noStrike">
-              <a:solidFill>
-                <a:srgbClr val="000000"/>
-              </a:solidFill>
-              <a:uFill>
-                <a:solidFill>
-                  <a:srgbClr val="ffffff"/>
+          <a:bodyPr lIns="0" tIns="0" rIns="0" bIns="0"/>
+          <a:lstStyle/>
+          <a:p>
+            <a:endParaRPr lang="es-MX" sz="3200" b="0" strike="noStrike" spc="-1">
+              <a:solidFill>
+                <a:srgbClr val="000000"/>
+              </a:solidFill>
+              <a:uFill>
+                <a:solidFill>
+                  <a:srgbClr val="FFFFFF"/>
                 </a:solidFill>
               </a:uFill>
               <a:latin typeface="Calibri"/>
@@ -729,11 +856,14 @@
       </p:sp>
     </p:spTree>
   </p:cSld>
+  <p:clrMapOvr>
+    <a:masterClrMapping/>
+  </p:clrMapOvr>
 </p:sldLayout>
 </file>
 
 <file path=ppt/slideLayouts/slideLayout4.xml><?xml version="1.0" encoding="utf-8"?>
-<p:sldLayout xmlns:a="http://schemas.openxmlformats.org/drawingml/2006/main" xmlns:p="http://schemas.openxmlformats.org/presentationml/2006/main" xmlns:r="http://schemas.openxmlformats.org/officeDocument/2006/relationships" xmlns:p14="http://schemas.microsoft.com/office/powerpoint/2010/main" xmlns:p15="http://schemas.microsoft.com/office/powerpoint/2012/main" xmlns:mc="http://schemas.openxmlformats.org/markup-compatibility/2006" type="twoObj" preserve="1">
+<p:sldLayout xmlns:a="http://schemas.openxmlformats.org/drawingml/2006/main" xmlns:r="http://schemas.openxmlformats.org/officeDocument/2006/relationships" xmlns:p="http://schemas.openxmlformats.org/presentationml/2006/main" type="twoObj" preserve="1">
   <p:cSld name="Title, 2 Content">
     <p:spTree>
       <p:nvGrpSpPr>
@@ -769,15 +899,16 @@
           </a:prstGeom>
         </p:spPr>
         <p:txBody>
-          <a:bodyPr lIns="0" rIns="0" tIns="0" bIns="0" anchor="ctr"/>
-          <a:p>
-            <a:endParaRPr b="0" lang="es-MX" sz="1800" spc="-1" strike="noStrike">
-              <a:solidFill>
-                <a:srgbClr val="000000"/>
-              </a:solidFill>
-              <a:uFill>
-                <a:solidFill>
-                  <a:srgbClr val="ffffff"/>
+          <a:bodyPr lIns="0" tIns="0" rIns="0" bIns="0" anchor="ctr"/>
+          <a:lstStyle/>
+          <a:p>
+            <a:endParaRPr lang="es-MX" sz="1800" b="0" strike="noStrike" spc="-1">
+              <a:solidFill>
+                <a:srgbClr val="000000"/>
+              </a:solidFill>
+              <a:uFill>
+                <a:solidFill>
+                  <a:srgbClr val="FFFFFF"/>
                 </a:solidFill>
               </a:uFill>
               <a:latin typeface="Calibri"/>
@@ -805,15 +936,16 @@
           </a:prstGeom>
         </p:spPr>
         <p:txBody>
-          <a:bodyPr lIns="0" rIns="0" tIns="0" bIns="0"/>
-          <a:p>
-            <a:endParaRPr b="0" lang="es-MX" sz="3200" spc="-1" strike="noStrike">
-              <a:solidFill>
-                <a:srgbClr val="000000"/>
-              </a:solidFill>
-              <a:uFill>
-                <a:solidFill>
-                  <a:srgbClr val="ffffff"/>
+          <a:bodyPr lIns="0" tIns="0" rIns="0" bIns="0"/>
+          <a:lstStyle/>
+          <a:p>
+            <a:endParaRPr lang="es-MX" sz="3200" b="0" strike="noStrike" spc="-1">
+              <a:solidFill>
+                <a:srgbClr val="000000"/>
+              </a:solidFill>
+              <a:uFill>
+                <a:solidFill>
+                  <a:srgbClr val="FFFFFF"/>
                 </a:solidFill>
               </a:uFill>
               <a:latin typeface="Calibri"/>
@@ -841,15 +973,16 @@
           </a:prstGeom>
         </p:spPr>
         <p:txBody>
-          <a:bodyPr lIns="0" rIns="0" tIns="0" bIns="0"/>
-          <a:p>
-            <a:endParaRPr b="0" lang="es-MX" sz="3200" spc="-1" strike="noStrike">
-              <a:solidFill>
-                <a:srgbClr val="000000"/>
-              </a:solidFill>
-              <a:uFill>
-                <a:solidFill>
-                  <a:srgbClr val="ffffff"/>
+          <a:bodyPr lIns="0" tIns="0" rIns="0" bIns="0"/>
+          <a:lstStyle/>
+          <a:p>
+            <a:endParaRPr lang="es-MX" sz="3200" b="0" strike="noStrike" spc="-1">
+              <a:solidFill>
+                <a:srgbClr val="000000"/>
+              </a:solidFill>
+              <a:uFill>
+                <a:solidFill>
+                  <a:srgbClr val="FFFFFF"/>
                 </a:solidFill>
               </a:uFill>
               <a:latin typeface="Calibri"/>
@@ -859,11 +992,14 @@
       </p:sp>
     </p:spTree>
   </p:cSld>
+  <p:clrMapOvr>
+    <a:masterClrMapping/>
+  </p:clrMapOvr>
 </p:sldLayout>
 </file>
 
 <file path=ppt/slideLayouts/slideLayout5.xml><?xml version="1.0" encoding="utf-8"?>
-<p:sldLayout xmlns:a="http://schemas.openxmlformats.org/drawingml/2006/main" xmlns:p="http://schemas.openxmlformats.org/presentationml/2006/main" xmlns:r="http://schemas.openxmlformats.org/officeDocument/2006/relationships" xmlns:p14="http://schemas.microsoft.com/office/powerpoint/2010/main" xmlns:p15="http://schemas.microsoft.com/office/powerpoint/2012/main" xmlns:mc="http://schemas.openxmlformats.org/markup-compatibility/2006" type="titleOnly" preserve="1">
+<p:sldLayout xmlns:a="http://schemas.openxmlformats.org/drawingml/2006/main" xmlns:r="http://schemas.openxmlformats.org/officeDocument/2006/relationships" xmlns:p="http://schemas.openxmlformats.org/presentationml/2006/main" type="titleOnly" preserve="1">
   <p:cSld name="Title Only">
     <p:spTree>
       <p:nvGrpSpPr>
@@ -899,15 +1035,16 @@
           </a:prstGeom>
         </p:spPr>
         <p:txBody>
-          <a:bodyPr lIns="0" rIns="0" tIns="0" bIns="0" anchor="ctr"/>
-          <a:p>
-            <a:endParaRPr b="0" lang="es-MX" sz="1800" spc="-1" strike="noStrike">
-              <a:solidFill>
-                <a:srgbClr val="000000"/>
-              </a:solidFill>
-              <a:uFill>
-                <a:solidFill>
-                  <a:srgbClr val="ffffff"/>
+          <a:bodyPr lIns="0" tIns="0" rIns="0" bIns="0" anchor="ctr"/>
+          <a:lstStyle/>
+          <a:p>
+            <a:endParaRPr lang="es-MX" sz="1800" b="0" strike="noStrike" spc="-1">
+              <a:solidFill>
+                <a:srgbClr val="000000"/>
+              </a:solidFill>
+              <a:uFill>
+                <a:solidFill>
+                  <a:srgbClr val="FFFFFF"/>
                 </a:solidFill>
               </a:uFill>
               <a:latin typeface="Calibri"/>
@@ -917,11 +1054,14 @@
       </p:sp>
     </p:spTree>
   </p:cSld>
+  <p:clrMapOvr>
+    <a:masterClrMapping/>
+  </p:clrMapOvr>
 </p:sldLayout>
 </file>
 
 <file path=ppt/slideLayouts/slideLayout6.xml><?xml version="1.0" encoding="utf-8"?>
-<p:sldLayout xmlns:a="http://schemas.openxmlformats.org/drawingml/2006/main" xmlns:p="http://schemas.openxmlformats.org/presentationml/2006/main" xmlns:r="http://schemas.openxmlformats.org/officeDocument/2006/relationships" xmlns:p14="http://schemas.microsoft.com/office/powerpoint/2010/main" xmlns:p15="http://schemas.microsoft.com/office/powerpoint/2012/main" xmlns:mc="http://schemas.openxmlformats.org/markup-compatibility/2006" type="objOnly" preserve="1">
+<p:sldLayout xmlns:a="http://schemas.openxmlformats.org/drawingml/2006/main" xmlns:r="http://schemas.openxmlformats.org/officeDocument/2006/relationships" xmlns:p="http://schemas.openxmlformats.org/presentationml/2006/main" type="objOnly" preserve="1">
   <p:cSld name="Centered Text">
     <p:spTree>
       <p:nvGrpSpPr>
@@ -957,16 +1097,17 @@
           </a:prstGeom>
         </p:spPr>
         <p:txBody>
-          <a:bodyPr lIns="0" rIns="0" tIns="0" bIns="0" anchor="ctr"/>
+          <a:bodyPr lIns="0" tIns="0" rIns="0" bIns="0" anchor="ctr"/>
+          <a:lstStyle/>
           <a:p>
             <a:pPr algn="ctr"/>
-            <a:endParaRPr b="0" lang="es-MX" sz="3200" spc="-1" strike="noStrike">
-              <a:solidFill>
-                <a:srgbClr val="000000"/>
-              </a:solidFill>
-              <a:uFill>
-                <a:solidFill>
-                  <a:srgbClr val="ffffff"/>
+            <a:endParaRPr lang="es-MX" sz="3200" b="0" strike="noStrike" spc="-1">
+              <a:solidFill>
+                <a:srgbClr val="000000"/>
+              </a:solidFill>
+              <a:uFill>
+                <a:solidFill>
+                  <a:srgbClr val="FFFFFF"/>
                 </a:solidFill>
               </a:uFill>
               <a:latin typeface="Arial"/>
@@ -976,11 +1117,14 @@
       </p:sp>
     </p:spTree>
   </p:cSld>
+  <p:clrMapOvr>
+    <a:masterClrMapping/>
+  </p:clrMapOvr>
 </p:sldLayout>
 </file>
 
 <file path=ppt/slideLayouts/slideLayout7.xml><?xml version="1.0" encoding="utf-8"?>
-<p:sldLayout xmlns:a="http://schemas.openxmlformats.org/drawingml/2006/main" xmlns:p="http://schemas.openxmlformats.org/presentationml/2006/main" xmlns:r="http://schemas.openxmlformats.org/officeDocument/2006/relationships" xmlns:p14="http://schemas.microsoft.com/office/powerpoint/2010/main" xmlns:p15="http://schemas.microsoft.com/office/powerpoint/2012/main" xmlns:mc="http://schemas.openxmlformats.org/markup-compatibility/2006" type="twoObjAndObj" preserve="1">
+<p:sldLayout xmlns:a="http://schemas.openxmlformats.org/drawingml/2006/main" xmlns:r="http://schemas.openxmlformats.org/officeDocument/2006/relationships" xmlns:p="http://schemas.openxmlformats.org/presentationml/2006/main" type="twoObjAndObj" preserve="1">
   <p:cSld name="Title, 2 Content and Content">
     <p:spTree>
       <p:nvGrpSpPr>
@@ -1016,15 +1160,16 @@
           </a:prstGeom>
         </p:spPr>
         <p:txBody>
-          <a:bodyPr lIns="0" rIns="0" tIns="0" bIns="0" anchor="ctr"/>
-          <a:p>
-            <a:endParaRPr b="0" lang="es-MX" sz="1800" spc="-1" strike="noStrike">
-              <a:solidFill>
-                <a:srgbClr val="000000"/>
-              </a:solidFill>
-              <a:uFill>
-                <a:solidFill>
-                  <a:srgbClr val="ffffff"/>
+          <a:bodyPr lIns="0" tIns="0" rIns="0" bIns="0" anchor="ctr"/>
+          <a:lstStyle/>
+          <a:p>
+            <a:endParaRPr lang="es-MX" sz="1800" b="0" strike="noStrike" spc="-1">
+              <a:solidFill>
+                <a:srgbClr val="000000"/>
+              </a:solidFill>
+              <a:uFill>
+                <a:solidFill>
+                  <a:srgbClr val="FFFFFF"/>
                 </a:solidFill>
               </a:uFill>
               <a:latin typeface="Calibri"/>
@@ -1052,15 +1197,16 @@
           </a:prstGeom>
         </p:spPr>
         <p:txBody>
-          <a:bodyPr lIns="0" rIns="0" tIns="0" bIns="0"/>
-          <a:p>
-            <a:endParaRPr b="0" lang="es-MX" sz="3200" spc="-1" strike="noStrike">
-              <a:solidFill>
-                <a:srgbClr val="000000"/>
-              </a:solidFill>
-              <a:uFill>
-                <a:solidFill>
-                  <a:srgbClr val="ffffff"/>
+          <a:bodyPr lIns="0" tIns="0" rIns="0" bIns="0"/>
+          <a:lstStyle/>
+          <a:p>
+            <a:endParaRPr lang="es-MX" sz="3200" b="0" strike="noStrike" spc="-1">
+              <a:solidFill>
+                <a:srgbClr val="000000"/>
+              </a:solidFill>
+              <a:uFill>
+                <a:solidFill>
+                  <a:srgbClr val="FFFFFF"/>
                 </a:solidFill>
               </a:uFill>
               <a:latin typeface="Calibri"/>
@@ -1088,15 +1234,16 @@
           </a:prstGeom>
         </p:spPr>
         <p:txBody>
-          <a:bodyPr lIns="0" rIns="0" tIns="0" bIns="0"/>
-          <a:p>
-            <a:endParaRPr b="0" lang="es-MX" sz="3200" spc="-1" strike="noStrike">
-              <a:solidFill>
-                <a:srgbClr val="000000"/>
-              </a:solidFill>
-              <a:uFill>
-                <a:solidFill>
-                  <a:srgbClr val="ffffff"/>
+          <a:bodyPr lIns="0" tIns="0" rIns="0" bIns="0"/>
+          <a:lstStyle/>
+          <a:p>
+            <a:endParaRPr lang="es-MX" sz="3200" b="0" strike="noStrike" spc="-1">
+              <a:solidFill>
+                <a:srgbClr val="000000"/>
+              </a:solidFill>
+              <a:uFill>
+                <a:solidFill>
+                  <a:srgbClr val="FFFFFF"/>
                 </a:solidFill>
               </a:uFill>
               <a:latin typeface="Calibri"/>
@@ -1124,15 +1271,16 @@
           </a:prstGeom>
         </p:spPr>
         <p:txBody>
-          <a:bodyPr lIns="0" rIns="0" tIns="0" bIns="0"/>
-          <a:p>
-            <a:endParaRPr b="0" lang="es-MX" sz="3200" spc="-1" strike="noStrike">
-              <a:solidFill>
-                <a:srgbClr val="000000"/>
-              </a:solidFill>
-              <a:uFill>
-                <a:solidFill>
-                  <a:srgbClr val="ffffff"/>
+          <a:bodyPr lIns="0" tIns="0" rIns="0" bIns="0"/>
+          <a:lstStyle/>
+          <a:p>
+            <a:endParaRPr lang="es-MX" sz="3200" b="0" strike="noStrike" spc="-1">
+              <a:solidFill>
+                <a:srgbClr val="000000"/>
+              </a:solidFill>
+              <a:uFill>
+                <a:solidFill>
+                  <a:srgbClr val="FFFFFF"/>
                 </a:solidFill>
               </a:uFill>
               <a:latin typeface="Calibri"/>
@@ -1142,11 +1290,14 @@
       </p:sp>
     </p:spTree>
   </p:cSld>
+  <p:clrMapOvr>
+    <a:masterClrMapping/>
+  </p:clrMapOvr>
 </p:sldLayout>
 </file>
 
 <file path=ppt/slideLayouts/slideLayout8.xml><?xml version="1.0" encoding="utf-8"?>
-<p:sldLayout xmlns:a="http://schemas.openxmlformats.org/drawingml/2006/main" xmlns:p="http://schemas.openxmlformats.org/presentationml/2006/main" xmlns:r="http://schemas.openxmlformats.org/officeDocument/2006/relationships" xmlns:p14="http://schemas.microsoft.com/office/powerpoint/2010/main" xmlns:p15="http://schemas.microsoft.com/office/powerpoint/2012/main" xmlns:mc="http://schemas.openxmlformats.org/markup-compatibility/2006" type="objAndTwoObj" preserve="1">
+<p:sldLayout xmlns:a="http://schemas.openxmlformats.org/drawingml/2006/main" xmlns:r="http://schemas.openxmlformats.org/officeDocument/2006/relationships" xmlns:p="http://schemas.openxmlformats.org/presentationml/2006/main" type="objAndTwoObj" preserve="1">
   <p:cSld name="Title Content and 2 Content">
     <p:spTree>
       <p:nvGrpSpPr>
@@ -1182,15 +1333,16 @@
           </a:prstGeom>
         </p:spPr>
         <p:txBody>
-          <a:bodyPr lIns="0" rIns="0" tIns="0" bIns="0" anchor="ctr"/>
-          <a:p>
-            <a:endParaRPr b="0" lang="es-MX" sz="1800" spc="-1" strike="noStrike">
-              <a:solidFill>
-                <a:srgbClr val="000000"/>
-              </a:solidFill>
-              <a:uFill>
-                <a:solidFill>
-                  <a:srgbClr val="ffffff"/>
+          <a:bodyPr lIns="0" tIns="0" rIns="0" bIns="0" anchor="ctr"/>
+          <a:lstStyle/>
+          <a:p>
+            <a:endParaRPr lang="es-MX" sz="1800" b="0" strike="noStrike" spc="-1">
+              <a:solidFill>
+                <a:srgbClr val="000000"/>
+              </a:solidFill>
+              <a:uFill>
+                <a:solidFill>
+                  <a:srgbClr val="FFFFFF"/>
                 </a:solidFill>
               </a:uFill>
               <a:latin typeface="Calibri"/>
@@ -1218,15 +1370,16 @@
           </a:prstGeom>
         </p:spPr>
         <p:txBody>
-          <a:bodyPr lIns="0" rIns="0" tIns="0" bIns="0"/>
-          <a:p>
-            <a:endParaRPr b="0" lang="es-MX" sz="3200" spc="-1" strike="noStrike">
-              <a:solidFill>
-                <a:srgbClr val="000000"/>
-              </a:solidFill>
-              <a:uFill>
-                <a:solidFill>
-                  <a:srgbClr val="ffffff"/>
+          <a:bodyPr lIns="0" tIns="0" rIns="0" bIns="0"/>
+          <a:lstStyle/>
+          <a:p>
+            <a:endParaRPr lang="es-MX" sz="3200" b="0" strike="noStrike" spc="-1">
+              <a:solidFill>
+                <a:srgbClr val="000000"/>
+              </a:solidFill>
+              <a:uFill>
+                <a:solidFill>
+                  <a:srgbClr val="FFFFFF"/>
                 </a:solidFill>
               </a:uFill>
               <a:latin typeface="Calibri"/>
@@ -1254,15 +1407,16 @@
           </a:prstGeom>
         </p:spPr>
         <p:txBody>
-          <a:bodyPr lIns="0" rIns="0" tIns="0" bIns="0"/>
-          <a:p>
-            <a:endParaRPr b="0" lang="es-MX" sz="3200" spc="-1" strike="noStrike">
-              <a:solidFill>
-                <a:srgbClr val="000000"/>
-              </a:solidFill>
-              <a:uFill>
-                <a:solidFill>
-                  <a:srgbClr val="ffffff"/>
+          <a:bodyPr lIns="0" tIns="0" rIns="0" bIns="0"/>
+          <a:lstStyle/>
+          <a:p>
+            <a:endParaRPr lang="es-MX" sz="3200" b="0" strike="noStrike" spc="-1">
+              <a:solidFill>
+                <a:srgbClr val="000000"/>
+              </a:solidFill>
+              <a:uFill>
+                <a:solidFill>
+                  <a:srgbClr val="FFFFFF"/>
                 </a:solidFill>
               </a:uFill>
               <a:latin typeface="Calibri"/>
@@ -1290,15 +1444,16 @@
           </a:prstGeom>
         </p:spPr>
         <p:txBody>
-          <a:bodyPr lIns="0" rIns="0" tIns="0" bIns="0"/>
-          <a:p>
-            <a:endParaRPr b="0" lang="es-MX" sz="3200" spc="-1" strike="noStrike">
-              <a:solidFill>
-                <a:srgbClr val="000000"/>
-              </a:solidFill>
-              <a:uFill>
-                <a:solidFill>
-                  <a:srgbClr val="ffffff"/>
+          <a:bodyPr lIns="0" tIns="0" rIns="0" bIns="0"/>
+          <a:lstStyle/>
+          <a:p>
+            <a:endParaRPr lang="es-MX" sz="3200" b="0" strike="noStrike" spc="-1">
+              <a:solidFill>
+                <a:srgbClr val="000000"/>
+              </a:solidFill>
+              <a:uFill>
+                <a:solidFill>
+                  <a:srgbClr val="FFFFFF"/>
                 </a:solidFill>
               </a:uFill>
               <a:latin typeface="Calibri"/>
@@ -1308,11 +1463,14 @@
       </p:sp>
     </p:spTree>
   </p:cSld>
+  <p:clrMapOvr>
+    <a:masterClrMapping/>
+  </p:clrMapOvr>
 </p:sldLayout>
 </file>
 
 <file path=ppt/slideLayouts/slideLayout9.xml><?xml version="1.0" encoding="utf-8"?>
-<p:sldLayout xmlns:a="http://schemas.openxmlformats.org/drawingml/2006/main" xmlns:p="http://schemas.openxmlformats.org/presentationml/2006/main" xmlns:r="http://schemas.openxmlformats.org/officeDocument/2006/relationships" xmlns:p14="http://schemas.microsoft.com/office/powerpoint/2010/main" xmlns:p15="http://schemas.microsoft.com/office/powerpoint/2012/main" xmlns:mc="http://schemas.openxmlformats.org/markup-compatibility/2006" type="twoObjOverTx" preserve="1">
+<p:sldLayout xmlns:a="http://schemas.openxmlformats.org/drawingml/2006/main" xmlns:r="http://schemas.openxmlformats.org/officeDocument/2006/relationships" xmlns:p="http://schemas.openxmlformats.org/presentationml/2006/main" type="twoObjOverTx" preserve="1">
   <p:cSld name="Title, 2 Content over Content">
     <p:spTree>
       <p:nvGrpSpPr>
@@ -1348,15 +1506,16 @@
           </a:prstGeom>
         </p:spPr>
         <p:txBody>
-          <a:bodyPr lIns="0" rIns="0" tIns="0" bIns="0" anchor="ctr"/>
-          <a:p>
-            <a:endParaRPr b="0" lang="es-MX" sz="1800" spc="-1" strike="noStrike">
-              <a:solidFill>
-                <a:srgbClr val="000000"/>
-              </a:solidFill>
-              <a:uFill>
-                <a:solidFill>
-                  <a:srgbClr val="ffffff"/>
+          <a:bodyPr lIns="0" tIns="0" rIns="0" bIns="0" anchor="ctr"/>
+          <a:lstStyle/>
+          <a:p>
+            <a:endParaRPr lang="es-MX" sz="1800" b="0" strike="noStrike" spc="-1">
+              <a:solidFill>
+                <a:srgbClr val="000000"/>
+              </a:solidFill>
+              <a:uFill>
+                <a:solidFill>
+                  <a:srgbClr val="FFFFFF"/>
                 </a:solidFill>
               </a:uFill>
               <a:latin typeface="Calibri"/>
@@ -1384,15 +1543,16 @@
           </a:prstGeom>
         </p:spPr>
         <p:txBody>
-          <a:bodyPr lIns="0" rIns="0" tIns="0" bIns="0"/>
-          <a:p>
-            <a:endParaRPr b="0" lang="es-MX" sz="3200" spc="-1" strike="noStrike">
-              <a:solidFill>
-                <a:srgbClr val="000000"/>
-              </a:solidFill>
-              <a:uFill>
-                <a:solidFill>
-                  <a:srgbClr val="ffffff"/>
+          <a:bodyPr lIns="0" tIns="0" rIns="0" bIns="0"/>
+          <a:lstStyle/>
+          <a:p>
+            <a:endParaRPr lang="es-MX" sz="3200" b="0" strike="noStrike" spc="-1">
+              <a:solidFill>
+                <a:srgbClr val="000000"/>
+              </a:solidFill>
+              <a:uFill>
+                <a:solidFill>
+                  <a:srgbClr val="FFFFFF"/>
                 </a:solidFill>
               </a:uFill>
               <a:latin typeface="Calibri"/>
@@ -1420,15 +1580,16 @@
           </a:prstGeom>
         </p:spPr>
         <p:txBody>
-          <a:bodyPr lIns="0" rIns="0" tIns="0" bIns="0"/>
-          <a:p>
-            <a:endParaRPr b="0" lang="es-MX" sz="3200" spc="-1" strike="noStrike">
-              <a:solidFill>
-                <a:srgbClr val="000000"/>
-              </a:solidFill>
-              <a:uFill>
-                <a:solidFill>
-                  <a:srgbClr val="ffffff"/>
+          <a:bodyPr lIns="0" tIns="0" rIns="0" bIns="0"/>
+          <a:lstStyle/>
+          <a:p>
+            <a:endParaRPr lang="es-MX" sz="3200" b="0" strike="noStrike" spc="-1">
+              <a:solidFill>
+                <a:srgbClr val="000000"/>
+              </a:solidFill>
+              <a:uFill>
+                <a:solidFill>
+                  <a:srgbClr val="FFFFFF"/>
                 </a:solidFill>
               </a:uFill>
               <a:latin typeface="Calibri"/>
@@ -1456,15 +1617,16 @@
           </a:prstGeom>
         </p:spPr>
         <p:txBody>
-          <a:bodyPr lIns="0" rIns="0" tIns="0" bIns="0"/>
-          <a:p>
-            <a:endParaRPr b="0" lang="es-MX" sz="3200" spc="-1" strike="noStrike">
-              <a:solidFill>
-                <a:srgbClr val="000000"/>
-              </a:solidFill>
-              <a:uFill>
-                <a:solidFill>
-                  <a:srgbClr val="ffffff"/>
+          <a:bodyPr lIns="0" tIns="0" rIns="0" bIns="0"/>
+          <a:lstStyle/>
+          <a:p>
+            <a:endParaRPr lang="es-MX" sz="3200" b="0" strike="noStrike" spc="-1">
+              <a:solidFill>
+                <a:srgbClr val="000000"/>
+              </a:solidFill>
+              <a:uFill>
+                <a:solidFill>
+                  <a:srgbClr val="FFFFFF"/>
                 </a:solidFill>
               </a:uFill>
               <a:latin typeface="Calibri"/>
@@ -1474,17 +1636,21 @@
       </p:sp>
     </p:spTree>
   </p:cSld>
+  <p:clrMapOvr>
+    <a:masterClrMapping/>
+  </p:clrMapOvr>
 </p:sldLayout>
 </file>
 
 <file path=ppt/slideMasters/slideMaster1.xml><?xml version="1.0" encoding="utf-8"?>
-<p:sldMaster xmlns:a="http://schemas.openxmlformats.org/drawingml/2006/main" xmlns:p="http://schemas.openxmlformats.org/presentationml/2006/main" xmlns:r="http://schemas.openxmlformats.org/officeDocument/2006/relationships" xmlns:p14="http://schemas.microsoft.com/office/powerpoint/2010/main" xmlns:p15="http://schemas.microsoft.com/office/powerpoint/2012/main" xmlns:mc="http://schemas.openxmlformats.org/markup-compatibility/2006">
+<p:sldMaster xmlns:a="http://schemas.openxmlformats.org/drawingml/2006/main" xmlns:r="http://schemas.openxmlformats.org/officeDocument/2006/relationships" xmlns:p="http://schemas.openxmlformats.org/presentationml/2006/main">
   <p:cSld>
     <p:bg>
       <p:bgPr>
         <a:solidFill>
-          <a:srgbClr val="ffffff"/>
+          <a:srgbClr val="FFFFFF"/>
         </a:solidFill>
+        <a:effectLst/>
       </p:bgPr>
     </p:bg>
     <p:spTree>
@@ -1503,7 +1669,7 @@
       </p:grpSpPr>
       <p:sp>
         <p:nvSpPr>
-          <p:cNvPr id="0" name="PlaceHolder 1"/>
+          <p:cNvPr id="5" name="PlaceHolder 1"/>
           <p:cNvSpPr>
             <a:spLocks noGrp="1"/>
           </p:cNvSpPr>
@@ -1522,6 +1688,7 @@
         </p:spPr>
         <p:txBody>
           <a:bodyPr anchor="ctr"/>
+          <a:lstStyle/>
           <a:p>
             <a:pPr algn="ctr">
               <a:lnSpc>
@@ -1529,64 +1696,36 @@
               </a:lnSpc>
             </a:pPr>
             <a:r>
-              <a:rPr b="0" lang="es-MX" sz="4400" spc="-1" strike="noStrike">
+              <a:rPr lang="es-MX" sz="4400" b="0" strike="noStrike" spc="-1">
                 <a:solidFill>
                   <a:srgbClr val="000000"/>
                 </a:solidFill>
                 <a:uFill>
                   <a:solidFill>
-                    <a:srgbClr val="ffffff"/>
+                    <a:srgbClr val="FFFFFF"/>
                   </a:solidFill>
                 </a:uFill>
                 <a:latin typeface="Calibri"/>
               </a:rPr>
-              <a:t>Haga clic para </a:t>
+              <a:t>Haga clic para modificar el estilo de título del patrón</a:t>
             </a:r>
-            <a:r>
-              <a:rPr b="0" lang="es-MX" sz="4400" spc="-1" strike="noStrike">
-                <a:solidFill>
-                  <a:srgbClr val="000000"/>
-                </a:solidFill>
-                <a:uFill>
-                  <a:solidFill>
-                    <a:srgbClr val="ffffff"/>
-                  </a:solidFill>
-                </a:uFill>
-                <a:latin typeface="Calibri"/>
-              </a:rPr>
-              <a:t>modificar el estilo de </a:t>
-            </a:r>
-            <a:r>
-              <a:rPr b="0" lang="es-MX" sz="4400" spc="-1" strike="noStrike">
-                <a:solidFill>
-                  <a:srgbClr val="000000"/>
-                </a:solidFill>
-                <a:uFill>
-                  <a:solidFill>
-                    <a:srgbClr val="ffffff"/>
-                  </a:solidFill>
-                </a:uFill>
-                <a:latin typeface="Calibri"/>
-              </a:rPr>
-              <a:t>título del patrón</a:t>
-            </a:r>
-            <a:endParaRPr b="0" lang="es-MX" sz="1800" spc="-1" strike="noStrike">
-              <a:solidFill>
-                <a:srgbClr val="000000"/>
-              </a:solidFill>
-              <a:uFill>
-                <a:solidFill>
-                  <a:srgbClr val="ffffff"/>
-                </a:solidFill>
-              </a:uFill>
-              <a:latin typeface="Calibri"/>
-            </a:endParaRPr>
-          </a:p>
-        </p:txBody>
-      </p:sp>
-      <p:sp>
-        <p:nvSpPr>
-          <p:cNvPr id="1" name="PlaceHolder 2"/>
+            <a:endParaRPr lang="es-MX" sz="1800" b="0" strike="noStrike" spc="-1">
+              <a:solidFill>
+                <a:srgbClr val="000000"/>
+              </a:solidFill>
+              <a:uFill>
+                <a:solidFill>
+                  <a:srgbClr val="FFFFFF"/>
+                </a:solidFill>
+              </a:uFill>
+              <a:latin typeface="Calibri"/>
+            </a:endParaRPr>
+          </a:p>
+        </p:txBody>
+      </p:sp>
+      <p:sp>
+        <p:nvSpPr>
+          <p:cNvPr id="6" name="PlaceHolder 2"/>
           <p:cNvSpPr>
             <a:spLocks noGrp="1"/>
           </p:cNvSpPr>
@@ -1605,6 +1744,7 @@
         </p:spPr>
         <p:txBody>
           <a:bodyPr anchor="ctr"/>
+          <a:lstStyle/>
           <a:p>
             <a:pPr>
               <a:lnSpc>
@@ -1612,26 +1752,26 @@
               </a:lnSpc>
             </a:pPr>
             <a:r>
-              <a:rPr b="0" lang="es-MX" sz="1200" spc="-1" strike="noStrike">
-                <a:solidFill>
-                  <a:srgbClr val="8b8b8b"/>
+              <a:rPr lang="es-MX" sz="1200" b="0" strike="noStrike" spc="-1">
+                <a:solidFill>
+                  <a:srgbClr val="8B8B8B"/>
                 </a:solidFill>
                 <a:uFill>
                   <a:solidFill>
-                    <a:srgbClr val="ffffff"/>
+                    <a:srgbClr val="FFFFFF"/>
                   </a:solidFill>
                 </a:uFill>
                 <a:latin typeface="Calibri"/>
               </a:rPr>
               <a:t>14/08/16</a:t>
             </a:r>
-            <a:endParaRPr b="0" lang="es-MX" sz="1400" spc="-1" strike="noStrike">
-              <a:solidFill>
-                <a:srgbClr val="000000"/>
-              </a:solidFill>
-              <a:uFill>
-                <a:solidFill>
-                  <a:srgbClr val="ffffff"/>
+            <a:endParaRPr lang="es-MX" sz="1400" b="0" strike="noStrike" spc="-1">
+              <a:solidFill>
+                <a:srgbClr val="000000"/>
+              </a:solidFill>
+              <a:uFill>
+                <a:solidFill>
+                  <a:srgbClr val="FFFFFF"/>
                 </a:solidFill>
               </a:uFill>
               <a:latin typeface="Times New Roman"/>
@@ -1660,14 +1800,15 @@
         </p:spPr>
         <p:txBody>
           <a:bodyPr anchor="ctr"/>
-          <a:p>
-            <a:endParaRPr b="0" lang="es-MX" sz="2400" spc="-1" strike="noStrike">
-              <a:solidFill>
-                <a:srgbClr val="000000"/>
-              </a:solidFill>
-              <a:uFill>
-                <a:solidFill>
-                  <a:srgbClr val="ffffff"/>
+          <a:lstStyle/>
+          <a:p>
+            <a:endParaRPr lang="es-MX" sz="2400" b="0" strike="noStrike" spc="-1">
+              <a:solidFill>
+                <a:srgbClr val="000000"/>
+              </a:solidFill>
+              <a:uFill>
+                <a:solidFill>
+                  <a:srgbClr val="FFFFFF"/>
                 </a:solidFill>
               </a:uFill>
               <a:latin typeface="Times New Roman"/>
@@ -1696,6 +1837,7 @@
         </p:spPr>
         <p:txBody>
           <a:bodyPr anchor="ctr"/>
+          <a:lstStyle/>
           <a:p>
             <a:pPr algn="r">
               <a:lnSpc>
@@ -1703,26 +1845,31 @@
               </a:lnSpc>
             </a:pPr>
             <a:fld id="{7993AE69-CC6B-43D3-8EB6-F740D5C0FE6F}" type="slidenum">
-              <a:rPr b="0" lang="es-MX" sz="1200" spc="-1" strike="noStrike">
-                <a:solidFill>
-                  <a:srgbClr val="8b8b8b"/>
+              <a:rPr lang="es-MX" sz="1200" b="0" strike="noStrike" spc="-1">
+                <a:solidFill>
+                  <a:srgbClr val="8B8B8B"/>
                 </a:solidFill>
                 <a:uFill>
                   <a:solidFill>
-                    <a:srgbClr val="ffffff"/>
+                    <a:srgbClr val="FFFFFF"/>
                   </a:solidFill>
                 </a:uFill>
                 <a:latin typeface="Calibri"/>
               </a:rPr>
-              <a:t>&lt;número&gt;</a:t>
+              <a:pPr algn="r">
+                <a:lnSpc>
+                  <a:spcPct val="100000"/>
+                </a:lnSpc>
+              </a:pPr>
+              <a:t>‹Nº›</a:t>
             </a:fld>
-            <a:endParaRPr b="0" lang="es-MX" sz="1400" spc="-1" strike="noStrike">
-              <a:solidFill>
-                <a:srgbClr val="000000"/>
-              </a:solidFill>
-              <a:uFill>
-                <a:solidFill>
-                  <a:srgbClr val="ffffff"/>
+            <a:endParaRPr lang="es-MX" sz="1400" b="0" strike="noStrike" spc="-1">
+              <a:solidFill>
+                <a:srgbClr val="000000"/>
+              </a:solidFill>
+              <a:uFill>
+                <a:solidFill>
+                  <a:srgbClr val="FFFFFF"/>
                 </a:solidFill>
               </a:uFill>
               <a:latin typeface="Times New Roman"/>
@@ -1750,7 +1897,8 @@
           </a:prstGeom>
         </p:spPr>
         <p:txBody>
-          <a:bodyPr lIns="0" rIns="0" tIns="0" bIns="0"/>
+          <a:bodyPr lIns="0" tIns="0" rIns="0" bIns="0"/>
+          <a:lstStyle/>
           <a:p>
             <a:pPr marL="432000" indent="-324000">
               <a:buClr>
@@ -1761,33 +1909,22 @@
               <a:buChar char=""/>
             </a:pPr>
             <a:r>
-              <a:rPr b="0" lang="es-MX" sz="3200" spc="-1" strike="noStrike">
+              <a:rPr lang="es-MX" sz="3200" b="0" strike="noStrike" spc="-1">
                 <a:solidFill>
                   <a:srgbClr val="000000"/>
                 </a:solidFill>
                 <a:uFill>
                   <a:solidFill>
-                    <a:srgbClr val="ffffff"/>
+                    <a:srgbClr val="FFFFFF"/>
                   </a:solidFill>
                 </a:uFill>
                 <a:latin typeface="Calibri"/>
               </a:rPr>
               <a:t>Pulse para editar el formato de esquema del texto</a:t>
             </a:r>
-            <a:endParaRPr b="0" lang="es-MX" sz="3200" spc="-1" strike="noStrike">
-              <a:solidFill>
-                <a:srgbClr val="000000"/>
-              </a:solidFill>
-              <a:uFill>
-                <a:solidFill>
-                  <a:srgbClr val="ffffff"/>
-                </a:solidFill>
-              </a:uFill>
-              <a:latin typeface="Calibri"/>
-            </a:endParaRPr>
-          </a:p>
-          <a:p>
-            <a:pPr lvl="1" marL="864000" indent="-324000">
+          </a:p>
+          <a:p>
+            <a:pPr marL="864000" lvl="1" indent="-324000">
               <a:buClr>
                 <a:srgbClr val="000000"/>
               </a:buClr>
@@ -1796,33 +1933,22 @@
               <a:buChar char=""/>
             </a:pPr>
             <a:r>
-              <a:rPr b="0" lang="es-MX" sz="2400" spc="-1" strike="noStrike">
+              <a:rPr lang="es-MX" sz="2400" b="0" strike="noStrike" spc="-1">
                 <a:solidFill>
                   <a:srgbClr val="000000"/>
                 </a:solidFill>
                 <a:uFill>
                   <a:solidFill>
-                    <a:srgbClr val="ffffff"/>
+                    <a:srgbClr val="FFFFFF"/>
                   </a:solidFill>
                 </a:uFill>
                 <a:latin typeface="Calibri"/>
               </a:rPr>
               <a:t>Segundo nivel del esquema</a:t>
             </a:r>
-            <a:endParaRPr b="0" lang="es-MX" sz="2400" spc="-1" strike="noStrike">
-              <a:solidFill>
-                <a:srgbClr val="000000"/>
-              </a:solidFill>
-              <a:uFill>
-                <a:solidFill>
-                  <a:srgbClr val="ffffff"/>
-                </a:solidFill>
-              </a:uFill>
-              <a:latin typeface="Calibri"/>
-            </a:endParaRPr>
-          </a:p>
-          <a:p>
-            <a:pPr lvl="2" marL="1296000" indent="-288000">
+          </a:p>
+          <a:p>
+            <a:pPr marL="1296000" lvl="2" indent="-288000">
               <a:buClr>
                 <a:srgbClr val="000000"/>
               </a:buClr>
@@ -1831,33 +1957,22 @@
               <a:buChar char=""/>
             </a:pPr>
             <a:r>
-              <a:rPr b="0" lang="es-MX" sz="2000" spc="-1" strike="noStrike">
+              <a:rPr lang="es-MX" sz="2000" b="0" strike="noStrike" spc="-1">
                 <a:solidFill>
                   <a:srgbClr val="000000"/>
                 </a:solidFill>
                 <a:uFill>
                   <a:solidFill>
-                    <a:srgbClr val="ffffff"/>
+                    <a:srgbClr val="FFFFFF"/>
                   </a:solidFill>
                 </a:uFill>
                 <a:latin typeface="Calibri"/>
               </a:rPr>
               <a:t>Tercer nivel del esquema</a:t>
             </a:r>
-            <a:endParaRPr b="0" lang="es-MX" sz="2000" spc="-1" strike="noStrike">
-              <a:solidFill>
-                <a:srgbClr val="000000"/>
-              </a:solidFill>
-              <a:uFill>
-                <a:solidFill>
-                  <a:srgbClr val="ffffff"/>
-                </a:solidFill>
-              </a:uFill>
-              <a:latin typeface="Calibri"/>
-            </a:endParaRPr>
-          </a:p>
-          <a:p>
-            <a:pPr lvl="3" marL="1728000" indent="-216000">
+          </a:p>
+          <a:p>
+            <a:pPr marL="1728000" lvl="3" indent="-216000">
               <a:buClr>
                 <a:srgbClr val="000000"/>
               </a:buClr>
@@ -1866,33 +1981,22 @@
               <a:buChar char=""/>
             </a:pPr>
             <a:r>
-              <a:rPr b="0" lang="es-MX" sz="2000" spc="-1" strike="noStrike">
+              <a:rPr lang="es-MX" sz="2000" b="0" strike="noStrike" spc="-1">
                 <a:solidFill>
                   <a:srgbClr val="000000"/>
                 </a:solidFill>
                 <a:uFill>
                   <a:solidFill>
-                    <a:srgbClr val="ffffff"/>
+                    <a:srgbClr val="FFFFFF"/>
                   </a:solidFill>
                 </a:uFill>
                 <a:latin typeface="Calibri"/>
               </a:rPr>
               <a:t>Cuarto nivel del esquema</a:t>
             </a:r>
-            <a:endParaRPr b="0" lang="es-MX" sz="2000" spc="-1" strike="noStrike">
-              <a:solidFill>
-                <a:srgbClr val="000000"/>
-              </a:solidFill>
-              <a:uFill>
-                <a:solidFill>
-                  <a:srgbClr val="ffffff"/>
-                </a:solidFill>
-              </a:uFill>
-              <a:latin typeface="Calibri"/>
-            </a:endParaRPr>
-          </a:p>
-          <a:p>
-            <a:pPr lvl="4" marL="2160000" indent="-216000">
+          </a:p>
+          <a:p>
+            <a:pPr marL="2160000" lvl="4" indent="-216000">
               <a:buClr>
                 <a:srgbClr val="000000"/>
               </a:buClr>
@@ -1901,33 +2005,22 @@
               <a:buChar char=""/>
             </a:pPr>
             <a:r>
-              <a:rPr b="0" lang="es-MX" sz="2000" spc="-1" strike="noStrike">
+              <a:rPr lang="es-MX" sz="2000" b="0" strike="noStrike" spc="-1">
                 <a:solidFill>
                   <a:srgbClr val="000000"/>
                 </a:solidFill>
                 <a:uFill>
                   <a:solidFill>
-                    <a:srgbClr val="ffffff"/>
+                    <a:srgbClr val="FFFFFF"/>
                   </a:solidFill>
                 </a:uFill>
                 <a:latin typeface="Calibri"/>
               </a:rPr>
               <a:t>Quinto nivel del esquema</a:t>
             </a:r>
-            <a:endParaRPr b="0" lang="es-MX" sz="2000" spc="-1" strike="noStrike">
-              <a:solidFill>
-                <a:srgbClr val="000000"/>
-              </a:solidFill>
-              <a:uFill>
-                <a:solidFill>
-                  <a:srgbClr val="ffffff"/>
-                </a:solidFill>
-              </a:uFill>
-              <a:latin typeface="Calibri"/>
-            </a:endParaRPr>
-          </a:p>
-          <a:p>
-            <a:pPr lvl="5" marL="2592000" indent="-216000">
+          </a:p>
+          <a:p>
+            <a:pPr marL="2592000" lvl="5" indent="-216000">
               <a:buClr>
                 <a:srgbClr val="000000"/>
               </a:buClr>
@@ -1936,33 +2029,22 @@
               <a:buChar char=""/>
             </a:pPr>
             <a:r>
-              <a:rPr b="0" lang="es-MX" sz="2000" spc="-1" strike="noStrike">
+              <a:rPr lang="es-MX" sz="2000" b="0" strike="noStrike" spc="-1">
                 <a:solidFill>
                   <a:srgbClr val="000000"/>
                 </a:solidFill>
                 <a:uFill>
                   <a:solidFill>
-                    <a:srgbClr val="ffffff"/>
+                    <a:srgbClr val="FFFFFF"/>
                   </a:solidFill>
                 </a:uFill>
                 <a:latin typeface="Calibri"/>
               </a:rPr>
               <a:t>Sexto nivel del esquema</a:t>
             </a:r>
-            <a:endParaRPr b="0" lang="es-MX" sz="2000" spc="-1" strike="noStrike">
-              <a:solidFill>
-                <a:srgbClr val="000000"/>
-              </a:solidFill>
-              <a:uFill>
-                <a:solidFill>
-                  <a:srgbClr val="ffffff"/>
-                </a:solidFill>
-              </a:uFill>
-              <a:latin typeface="Calibri"/>
-            </a:endParaRPr>
-          </a:p>
-          <a:p>
-            <a:pPr lvl="6" marL="3024000" indent="-216000">
+          </a:p>
+          <a:p>
+            <a:pPr marL="3024000" lvl="6" indent="-216000">
               <a:buClr>
                 <a:srgbClr val="000000"/>
               </a:buClr>
@@ -1971,55 +2053,49 @@
               <a:buChar char=""/>
             </a:pPr>
             <a:r>
-              <a:rPr b="0" lang="es-MX" sz="2000" spc="-1" strike="noStrike">
+              <a:rPr lang="es-MX" sz="2000" b="0" strike="noStrike" spc="-1">
                 <a:solidFill>
                   <a:srgbClr val="000000"/>
                 </a:solidFill>
                 <a:uFill>
                   <a:solidFill>
-                    <a:srgbClr val="ffffff"/>
+                    <a:srgbClr val="FFFFFF"/>
                   </a:solidFill>
                 </a:uFill>
                 <a:latin typeface="Calibri"/>
               </a:rPr>
               <a:t>Séptimo nivel del esquema</a:t>
             </a:r>
-            <a:endParaRPr b="0" lang="es-MX" sz="2000" spc="-1" strike="noStrike">
-              <a:solidFill>
-                <a:srgbClr val="000000"/>
-              </a:solidFill>
-              <a:uFill>
-                <a:solidFill>
-                  <a:srgbClr val="ffffff"/>
-                </a:solidFill>
-              </a:uFill>
-              <a:latin typeface="Calibri"/>
-            </a:endParaRPr>
           </a:p>
         </p:txBody>
       </p:sp>
     </p:spTree>
   </p:cSld>
-  <p:clrMap bg1="lt1" bg2="lt2" tx1="dk1" tx2="dk2" accent1="accent1" accent2="accent2" accent3="accent3" accent4="accent4" accent5="accent5" accent6="accent6" hlink="hlink" folHlink="folHlink"/>
+  <p:clrMap bg1="lt1" tx1="dk1" bg2="lt2" tx2="dk2" accent1="accent1" accent2="accent2" accent3="accent3" accent4="accent4" accent5="accent5" accent6="accent6" hlink="hlink" folHlink="folHlink"/>
   <p:sldLayoutIdLst>
-    <p:sldLayoutId id="2147483649" r:id="rId2"/>
-    <p:sldLayoutId id="2147483650" r:id="rId3"/>
-    <p:sldLayoutId id="2147483651" r:id="rId4"/>
-    <p:sldLayoutId id="2147483652" r:id="rId5"/>
-    <p:sldLayoutId id="2147483653" r:id="rId6"/>
-    <p:sldLayoutId id="2147483654" r:id="rId7"/>
-    <p:sldLayoutId id="2147483655" r:id="rId8"/>
-    <p:sldLayoutId id="2147483656" r:id="rId9"/>
-    <p:sldLayoutId id="2147483657" r:id="rId10"/>
-    <p:sldLayoutId id="2147483658" r:id="rId11"/>
-    <p:sldLayoutId id="2147483659" r:id="rId12"/>
-    <p:sldLayoutId id="2147483660" r:id="rId13"/>
+    <p:sldLayoutId id="2147483649" r:id="rId1"/>
+    <p:sldLayoutId id="2147483650" r:id="rId2"/>
+    <p:sldLayoutId id="2147483651" r:id="rId3"/>
+    <p:sldLayoutId id="2147483652" r:id="rId4"/>
+    <p:sldLayoutId id="2147483653" r:id="rId5"/>
+    <p:sldLayoutId id="2147483654" r:id="rId6"/>
+    <p:sldLayoutId id="2147483655" r:id="rId7"/>
+    <p:sldLayoutId id="2147483656" r:id="rId8"/>
+    <p:sldLayoutId id="2147483657" r:id="rId9"/>
+    <p:sldLayoutId id="2147483658" r:id="rId10"/>
+    <p:sldLayoutId id="2147483659" r:id="rId11"/>
+    <p:sldLayoutId id="2147483660" r:id="rId12"/>
   </p:sldLayoutIdLst>
+  <p:txStyles>
+    <p:titleStyle/>
+    <p:bodyStyle/>
+    <p:otherStyle/>
+  </p:txStyles>
 </p:sldMaster>
 </file>
 
 <file path=ppt/slides/slide1.xml><?xml version="1.0" encoding="utf-8"?>
-<p:sld xmlns:a="http://schemas.openxmlformats.org/drawingml/2006/main" xmlns:p="http://schemas.openxmlformats.org/presentationml/2006/main" xmlns:r="http://schemas.openxmlformats.org/officeDocument/2006/relationships" xmlns:p14="http://schemas.microsoft.com/office/powerpoint/2010/main" xmlns:p15="http://schemas.microsoft.com/office/powerpoint/2012/main" xmlns:mc="http://schemas.openxmlformats.org/markup-compatibility/2006">
+<p:sld xmlns:a="http://schemas.openxmlformats.org/drawingml/2006/main" xmlns:r="http://schemas.openxmlformats.org/officeDocument/2006/relationships" xmlns:p="http://schemas.openxmlformats.org/presentationml/2006/main">
   <p:cSld>
     <p:spTree>
       <p:nvGrpSpPr>
@@ -2056,14 +2132,15 @@
         </p:spPr>
         <p:txBody>
           <a:bodyPr anchor="ctr"/>
-          <a:p>
-            <a:endParaRPr b="0" lang="es-MX" sz="1800" spc="-1" strike="noStrike">
-              <a:solidFill>
-                <a:srgbClr val="000000"/>
-              </a:solidFill>
-              <a:uFill>
-                <a:solidFill>
-                  <a:srgbClr val="ffffff"/>
+          <a:lstStyle/>
+          <a:p>
+            <a:endParaRPr lang="es-MX" sz="1800" b="0" strike="noStrike" spc="-1">
+              <a:solidFill>
+                <a:srgbClr val="000000"/>
+              </a:solidFill>
+              <a:uFill>
+                <a:solidFill>
+                  <a:srgbClr val="FFFFFF"/>
                 </a:solidFill>
               </a:uFill>
               <a:latin typeface="Calibri"/>
@@ -2092,15 +2169,16 @@
         </p:spPr>
         <p:txBody>
           <a:bodyPr/>
+          <a:lstStyle/>
           <a:p>
             <a:pPr algn="ctr"/>
-            <a:endParaRPr b="0" lang="es-MX" sz="3200" spc="-1" strike="noStrike">
-              <a:solidFill>
-                <a:srgbClr val="000000"/>
-              </a:solidFill>
-              <a:uFill>
-                <a:solidFill>
-                  <a:srgbClr val="ffffff"/>
+            <a:endParaRPr lang="es-MX" sz="3200" b="0" strike="noStrike" spc="-1">
+              <a:solidFill>
+                <a:srgbClr val="000000"/>
+              </a:solidFill>
+              <a:uFill>
+                <a:solidFill>
+                  <a:srgbClr val="FFFFFF"/>
                 </a:solidFill>
               </a:uFill>
               <a:latin typeface="Arial"/>
@@ -2110,12 +2188,12 @@
       </p:sp>
       <p:pic>
         <p:nvPicPr>
-          <p:cNvPr id="41" name="Picture 2" descr=""/>
+          <p:cNvPr id="41" name="Picture 2"/>
           <p:cNvPicPr/>
           <p:nvPr/>
         </p:nvPicPr>
         <p:blipFill>
-          <a:blip r:embed="rId1"/>
+          <a:blip r:embed="rId2"/>
           <a:stretch/>
         </p:blipFill>
         <p:spPr>
@@ -2133,6 +2211,9 @@
       </p:pic>
     </p:spTree>
   </p:cSld>
+  <p:clrMapOvr>
+    <a:masterClrMapping/>
+  </p:clrMapOvr>
   <p:timing>
     <p:tnLst>
       <p:par>
@@ -2141,14 +2222,14 @@
             <p:seq>
               <p:cTn id="2" nodeType="mainSeq"/>
               <p:prevCondLst>
-                <p:cond delay="0" evt="onPrev">
+                <p:cond evt="onPrev" delay="0">
                   <p:tgtEl>
                     <p:sldTgt/>
                   </p:tgtEl>
                 </p:cond>
               </p:prevCondLst>
               <p:nextCondLst>
-                <p:cond delay="0" evt="onNext">
+                <p:cond evt="onNext" delay="0">
                   <p:tgtEl>
                     <p:sldTgt/>
                   </p:tgtEl>
@@ -2164,7 +2245,7 @@
 </file>
 
 <file path=ppt/slides/slide2.xml><?xml version="1.0" encoding="utf-8"?>
-<p:sld xmlns:a="http://schemas.openxmlformats.org/drawingml/2006/main" xmlns:p="http://schemas.openxmlformats.org/presentationml/2006/main" xmlns:r="http://schemas.openxmlformats.org/officeDocument/2006/relationships" xmlns:p14="http://schemas.microsoft.com/office/powerpoint/2010/main" xmlns:p15="http://schemas.microsoft.com/office/powerpoint/2012/main" xmlns:mc="http://schemas.openxmlformats.org/markup-compatibility/2006">
+<p:sld xmlns:a="http://schemas.openxmlformats.org/drawingml/2006/main" xmlns:r="http://schemas.openxmlformats.org/officeDocument/2006/relationships" xmlns:p="http://schemas.openxmlformats.org/presentationml/2006/main">
   <p:cSld>
     <p:spTree>
       <p:nvGrpSpPr>
@@ -2200,15 +2281,16 @@
           </a:ln>
         </p:spPr>
         <p:txBody>
-          <a:bodyPr lIns="0" rIns="0" tIns="0" bIns="0" anchor="ctr"/>
-          <a:p>
-            <a:endParaRPr b="0" lang="es-MX" sz="1800" spc="-1" strike="noStrike">
-              <a:solidFill>
-                <a:srgbClr val="000000"/>
-              </a:solidFill>
-              <a:uFill>
-                <a:solidFill>
-                  <a:srgbClr val="ffffff"/>
+          <a:bodyPr lIns="0" tIns="0" rIns="0" bIns="0" anchor="ctr"/>
+          <a:lstStyle/>
+          <a:p>
+            <a:endParaRPr lang="es-MX" sz="1800" b="0" strike="noStrike" spc="-1">
+              <a:solidFill>
+                <a:srgbClr val="000000"/>
+              </a:solidFill>
+              <a:uFill>
+                <a:solidFill>
+                  <a:srgbClr val="FFFFFF"/>
                 </a:solidFill>
               </a:uFill>
               <a:latin typeface="Calibri"/>
@@ -2236,15 +2318,16 @@
           </a:ln>
         </p:spPr>
         <p:txBody>
-          <a:bodyPr lIns="0" rIns="0" tIns="0" bIns="0"/>
-          <a:p>
-            <a:endParaRPr b="0" lang="es-MX" sz="3200" spc="-1" strike="noStrike">
-              <a:solidFill>
-                <a:srgbClr val="000000"/>
-              </a:solidFill>
-              <a:uFill>
-                <a:solidFill>
-                  <a:srgbClr val="ffffff"/>
+          <a:bodyPr lIns="0" tIns="0" rIns="0" bIns="0"/>
+          <a:lstStyle/>
+          <a:p>
+            <a:endParaRPr lang="es-MX" sz="3200" b="0" strike="noStrike" spc="-1">
+              <a:solidFill>
+                <a:srgbClr val="000000"/>
+              </a:solidFill>
+              <a:uFill>
+                <a:solidFill>
+                  <a:srgbClr val="FFFFFF"/>
                 </a:solidFill>
               </a:uFill>
               <a:latin typeface="Calibri"/>
@@ -2254,12 +2337,12 @@
       </p:sp>
       <p:pic>
         <p:nvPicPr>
-          <p:cNvPr id="44" name="" descr=""/>
+          <p:cNvPr id="44" name="43 Imagen"/>
           <p:cNvPicPr/>
           <p:nvPr/>
         </p:nvPicPr>
         <p:blipFill>
-          <a:blip r:embed="rId1"/>
+          <a:blip r:embed="rId2"/>
           <a:stretch/>
         </p:blipFill>
         <p:spPr>
@@ -2277,6 +2360,201 @@
       </p:pic>
     </p:spTree>
   </p:cSld>
+  <p:clrMapOvr>
+    <a:masterClrMapping/>
+  </p:clrMapOvr>
+</p:sld>
+</file>
+
+<file path=ppt/slides/slide3.xml><?xml version="1.0" encoding="utf-8"?>
+<p:sld xmlns:a="http://schemas.openxmlformats.org/drawingml/2006/main" xmlns:r="http://schemas.openxmlformats.org/officeDocument/2006/relationships" xmlns:p="http://schemas.openxmlformats.org/presentationml/2006/main">
+  <p:cSld>
+    <p:spTree>
+      <p:nvGrpSpPr>
+        <p:cNvPr id="1" name=""/>
+        <p:cNvGrpSpPr/>
+        <p:nvPr/>
+      </p:nvGrpSpPr>
+      <p:grpSpPr>
+        <a:xfrm>
+          <a:off x="0" y="0"/>
+          <a:ext cx="0" cy="0"/>
+          <a:chOff x="0" y="0"/>
+          <a:chExt cx="0" cy="0"/>
+        </a:xfrm>
+      </p:grpSpPr>
+      <p:sp>
+        <p:nvSpPr>
+          <p:cNvPr id="2" name="1 Título"/>
+          <p:cNvSpPr>
+            <a:spLocks noGrp="1"/>
+          </p:cNvSpPr>
+          <p:nvPr>
+            <p:ph type="title"/>
+          </p:nvPr>
+        </p:nvSpPr>
+        <p:spPr/>
+        <p:txBody>
+          <a:bodyPr/>
+          <a:lstStyle/>
+          <a:p>
+            <a:endParaRPr lang="es-MX"/>
+          </a:p>
+        </p:txBody>
+      </p:sp>
+      <p:sp>
+        <p:nvSpPr>
+          <p:cNvPr id="3" name="2 Marcador de texto"/>
+          <p:cNvSpPr>
+            <a:spLocks noGrp="1"/>
+          </p:cNvSpPr>
+          <p:nvPr>
+            <p:ph type="body"/>
+          </p:nvPr>
+        </p:nvSpPr>
+        <p:spPr/>
+        <p:txBody>
+          <a:bodyPr/>
+          <a:lstStyle/>
+          <a:p>
+            <a:endParaRPr lang="es-MX"/>
+          </a:p>
+        </p:txBody>
+      </p:sp>
+      <p:pic>
+        <p:nvPicPr>
+          <p:cNvPr id="1026" name="Picture 2"/>
+          <p:cNvPicPr>
+            <a:picLocks noChangeAspect="1" noChangeArrowheads="1"/>
+          </p:cNvPicPr>
+          <p:nvPr/>
+        </p:nvPicPr>
+        <p:blipFill>
+          <a:blip r:embed="rId2"/>
+          <a:srcRect/>
+          <a:stretch>
+            <a:fillRect/>
+          </a:stretch>
+        </p:blipFill>
+        <p:spPr bwMode="auto">
+          <a:xfrm>
+            <a:off x="-15359202" y="2428868"/>
+            <a:ext cx="22764750" cy="7315200"/>
+          </a:xfrm>
+          <a:prstGeom prst="rect">
+            <a:avLst/>
+          </a:prstGeom>
+          <a:noFill/>
+          <a:ln w="9525">
+            <a:noFill/>
+            <a:miter lim="800000"/>
+            <a:headEnd/>
+            <a:tailEnd/>
+          </a:ln>
+          <a:effectLst/>
+        </p:spPr>
+      </p:pic>
+    </p:spTree>
+  </p:cSld>
+  <p:clrMapOvr>
+    <a:masterClrMapping/>
+  </p:clrMapOvr>
+</p:sld>
+</file>
+
+<file path=ppt/slides/slide4.xml><?xml version="1.0" encoding="utf-8"?>
+<p:sld xmlns:a="http://schemas.openxmlformats.org/drawingml/2006/main" xmlns:r="http://schemas.openxmlformats.org/officeDocument/2006/relationships" xmlns:p="http://schemas.openxmlformats.org/presentationml/2006/main">
+  <p:cSld>
+    <p:spTree>
+      <p:nvGrpSpPr>
+        <p:cNvPr id="1" name=""/>
+        <p:cNvGrpSpPr/>
+        <p:nvPr/>
+      </p:nvGrpSpPr>
+      <p:grpSpPr>
+        <a:xfrm>
+          <a:off x="0" y="0"/>
+          <a:ext cx="0" cy="0"/>
+          <a:chOff x="0" y="0"/>
+          <a:chExt cx="0" cy="0"/>
+        </a:xfrm>
+      </p:grpSpPr>
+      <p:sp>
+        <p:nvSpPr>
+          <p:cNvPr id="2" name="1 Título"/>
+          <p:cNvSpPr>
+            <a:spLocks noGrp="1"/>
+          </p:cNvSpPr>
+          <p:nvPr>
+            <p:ph type="title"/>
+          </p:nvPr>
+        </p:nvSpPr>
+        <p:spPr/>
+        <p:txBody>
+          <a:bodyPr/>
+          <a:lstStyle/>
+          <a:p>
+            <a:endParaRPr lang="es-MX"/>
+          </a:p>
+        </p:txBody>
+      </p:sp>
+      <p:sp>
+        <p:nvSpPr>
+          <p:cNvPr id="3" name="2 Marcador de texto"/>
+          <p:cNvSpPr>
+            <a:spLocks noGrp="1"/>
+          </p:cNvSpPr>
+          <p:nvPr>
+            <p:ph type="body"/>
+          </p:nvPr>
+        </p:nvSpPr>
+        <p:spPr/>
+        <p:txBody>
+          <a:bodyPr/>
+          <a:lstStyle/>
+          <a:p>
+            <a:endParaRPr lang="es-MX"/>
+          </a:p>
+        </p:txBody>
+      </p:sp>
+      <p:pic>
+        <p:nvPicPr>
+          <p:cNvPr id="1026" name="Picture 2"/>
+          <p:cNvPicPr>
+            <a:picLocks noChangeAspect="1" noChangeArrowheads="1"/>
+          </p:cNvPicPr>
+          <p:nvPr/>
+        </p:nvPicPr>
+        <p:blipFill>
+          <a:blip r:embed="rId2"/>
+          <a:srcRect/>
+          <a:stretch>
+            <a:fillRect/>
+          </a:stretch>
+        </p:blipFill>
+        <p:spPr bwMode="auto">
+          <a:xfrm>
+            <a:off x="-13144624" y="571480"/>
+            <a:ext cx="22764750" cy="7315200"/>
+          </a:xfrm>
+          <a:prstGeom prst="rect">
+            <a:avLst/>
+          </a:prstGeom>
+          <a:noFill/>
+          <a:ln w="9525">
+            <a:noFill/>
+            <a:miter lim="800000"/>
+            <a:headEnd/>
+            <a:tailEnd/>
+          </a:ln>
+          <a:effectLst/>
+        </p:spPr>
+      </p:pic>
+    </p:spTree>
+  </p:cSld>
+  <p:clrMapOvr>
+    <a:masterClrMapping/>
+  </p:clrMapOvr>
 </p:sld>
 </file>
 
@@ -2500,5 +2778,7 @@
       </a:bgFillStyleLst>
     </a:fmtScheme>
   </a:themeElements>
+  <a:objectDefaults/>
+  <a:extraClrSchemeLst/>
 </a:theme>
 </file>
</xml_diff>